<commit_message>
updates in preparation for webinar delivery
</commit_message>
<xml_diff>
--- a/air-webinar-materials/slides/Sentiment Analysis in R.pptx
+++ b/air-webinar-materials/slides/Sentiment Analysis in R.pptx
@@ -221,7 +221,7 @@
           <a:p>
             <a:fld id="{73CD064E-05FC-4E18-9D0C-A4994F368CAC}" type="datetimeFigureOut">
               <a:rPr lang="en-US" smtClean="0"/>
-              <a:t>9/28/2021</a:t>
+              <a:t>10/14/2021</a:t>
             </a:fld>
             <a:endParaRPr lang="en-US"/>
           </a:p>
@@ -536,7 +536,7 @@
               <a:rPr lang="en-US" dirty="0">
                 <a:cs typeface="Calibri"/>
               </a:rPr>
-              <a:t>Your notes here</a:t>
+              <a:t>Zoom In RStudio to make code text larger</a:t>
             </a:r>
           </a:p>
         </p:txBody>
@@ -4887,7 +4887,7 @@
           <a:p>
             <a:fld id="{C9727A96-7105-44AE-B9F0-3BA74D06A54C}" type="datetimeFigureOut">
               <a:rPr lang="en-US" smtClean="0"/>
-              <a:t>9/28/2021</a:t>
+              <a:t>10/14/2021</a:t>
             </a:fld>
             <a:endParaRPr lang="en-US"/>
           </a:p>
@@ -5085,7 +5085,7 @@
           <a:p>
             <a:fld id="{C9727A96-7105-44AE-B9F0-3BA74D06A54C}" type="datetimeFigureOut">
               <a:rPr lang="en-US" smtClean="0"/>
-              <a:t>9/28/2021</a:t>
+              <a:t>10/14/2021</a:t>
             </a:fld>
             <a:endParaRPr lang="en-US"/>
           </a:p>
@@ -5321,7 +5321,7 @@
           <a:p>
             <a:fld id="{C9727A96-7105-44AE-B9F0-3BA74D06A54C}" type="datetimeFigureOut">
               <a:rPr lang="en-US" smtClean="0"/>
-              <a:t>9/28/2021</a:t>
+              <a:t>10/14/2021</a:t>
             </a:fld>
             <a:endParaRPr lang="en-US"/>
           </a:p>
@@ -5657,7 +5657,7 @@
           <a:p>
             <a:fld id="{986F8839-423C-1541-BA9A-A38B5B6A10D1}" type="datetimeFigureOut">
               <a:rPr lang="en-US" smtClean="0"/>
-              <a:t>9/28/2021</a:t>
+              <a:t>10/14/2021</a:t>
             </a:fld>
             <a:endParaRPr lang="en-US"/>
           </a:p>

</xml_diff>